<commit_message>
Some changes in the instruction and #3
</commit_message>
<xml_diff>
--- a/Matlab/Лекция №3 - Методы обработки сигналов.pptx
+++ b/Matlab/Лекция №3 - Методы обработки сигналов.pptx
@@ -293,7 +293,7 @@
               <a:pPr>
                 <a:defRPr/>
               </a:pPr>
-              <a:t>12.09.2023</a:t>
+              <a:t>10.09.2024</a:t>
             </a:fld>
             <a:endParaRPr lang="ru-RU"/>
           </a:p>
@@ -799,7 +799,7 @@
               <a:pPr>
                 <a:defRPr/>
               </a:pPr>
-              <a:t>12.09.2023</a:t>
+              <a:t>10.09.2024</a:t>
             </a:fld>
             <a:endParaRPr lang="ru-RU"/>
           </a:p>
@@ -991,7 +991,7 @@
               <a:pPr>
                 <a:defRPr/>
               </a:pPr>
-              <a:t>12.09.2023</a:t>
+              <a:t>10.09.2024</a:t>
             </a:fld>
             <a:endParaRPr lang="ru-RU"/>
           </a:p>
@@ -1193,7 +1193,7 @@
               <a:pPr>
                 <a:defRPr/>
               </a:pPr>
-              <a:t>12.09.2023</a:t>
+              <a:t>10.09.2024</a:t>
             </a:fld>
             <a:endParaRPr lang="ru-RU"/>
           </a:p>
@@ -1385,7 +1385,7 @@
               <a:pPr>
                 <a:defRPr/>
               </a:pPr>
-              <a:t>12.09.2023</a:t>
+              <a:t>10.09.2024</a:t>
             </a:fld>
             <a:endParaRPr lang="ru-RU"/>
           </a:p>
@@ -1654,7 +1654,7 @@
               <a:pPr>
                 <a:defRPr/>
               </a:pPr>
-              <a:t>12.09.2023</a:t>
+              <a:t>10.09.2024</a:t>
             </a:fld>
             <a:endParaRPr lang="ru-RU"/>
           </a:p>
@@ -1945,7 +1945,7 @@
               <a:pPr>
                 <a:defRPr/>
               </a:pPr>
-              <a:t>12.09.2023</a:t>
+              <a:t>10.09.2024</a:t>
             </a:fld>
             <a:endParaRPr lang="ru-RU"/>
           </a:p>
@@ -2350,7 +2350,7 @@
               <a:pPr>
                 <a:defRPr/>
               </a:pPr>
-              <a:t>12.09.2023</a:t>
+              <a:t>10.09.2024</a:t>
             </a:fld>
             <a:endParaRPr lang="ru-RU"/>
           </a:p>
@@ -2527,7 +2527,7 @@
               <a:pPr>
                 <a:defRPr/>
               </a:pPr>
-              <a:t>12.09.2023</a:t>
+              <a:t>10.09.2024</a:t>
             </a:fld>
             <a:endParaRPr lang="ru-RU"/>
           </a:p>
@@ -2644,7 +2644,7 @@
               <a:pPr>
                 <a:defRPr/>
               </a:pPr>
-              <a:t>12.09.2023</a:t>
+              <a:t>10.09.2024</a:t>
             </a:fld>
             <a:endParaRPr lang="ru-RU"/>
           </a:p>
@@ -2932,7 +2932,7 @@
               <a:pPr>
                 <a:defRPr/>
               </a:pPr>
-              <a:t>12.09.2023</a:t>
+              <a:t>10.09.2024</a:t>
             </a:fld>
             <a:endParaRPr lang="ru-RU"/>
           </a:p>
@@ -3574,7 +3574,7 @@
               <a:pPr>
                 <a:defRPr/>
               </a:pPr>
-              <a:t>12.09.2023</a:t>
+              <a:t>10.09.2024</a:t>
             </a:fld>
             <a:endParaRPr lang="ru-RU"/>
           </a:p>
@@ -4098,7 +4098,7 @@
               <a:pPr>
                 <a:defRPr/>
               </a:pPr>
-              <a:t>12.09.2023</a:t>
+              <a:t>10.09.2024</a:t>
             </a:fld>
             <a:endParaRPr lang="ru-RU"/>
           </a:p>
@@ -5105,15 +5105,7 @@
             </a:r>
             <a:r>
               <a:rPr lang="en-US" dirty="0"/>
-              <a:t>format </a:t>
-            </a:r>
-            <a:r>
-              <a:rPr lang="en-US" dirty="0" err="1"/>
-              <a:t>chort</a:t>
-            </a:r>
-            <a:r>
-              <a:rPr lang="en-US" dirty="0"/>
-              <a:t>	 </a:t>
+              <a:t>format short	 </a:t>
             </a:r>
             <a:r>
               <a:rPr lang="ru-RU" dirty="0"/>
@@ -5128,15 +5120,23 @@
             </a:pPr>
             <a:r>
               <a:rPr lang="en-US" dirty="0"/>
-              <a:t> format </a:t>
-            </a:r>
-            <a:r>
-              <a:rPr lang="en-US" dirty="0" err="1"/>
-              <a:t>chort</a:t>
+              <a:t> </a:t>
+            </a:r>
+            <a:r>
+              <a:rPr lang="en-US"/>
+              <a:t>format </a:t>
             </a:r>
             <a:r>
               <a:rPr lang="en-US" dirty="0"/>
-              <a:t> e	 </a:t>
+              <a:t>s</a:t>
+            </a:r>
+            <a:r>
+              <a:rPr lang="en-US"/>
+              <a:t>hort </a:t>
+            </a:r>
+            <a:r>
+              <a:rPr lang="en-US" dirty="0"/>
+              <a:t>e	 </a:t>
             </a:r>
             <a:r>
               <a:rPr lang="ru-RU" dirty="0"/>
@@ -5602,7 +5602,7 @@
               <a:pPr>
                 <a:defRPr/>
               </a:pPr>
-              <a:t>12.09.2023</a:t>
+              <a:t>10.09.2024</a:t>
             </a:fld>
             <a:endParaRPr lang="ru-RU" dirty="0"/>
           </a:p>
@@ -7549,7 +7549,7 @@
               <a:pPr>
                 <a:defRPr/>
               </a:pPr>
-              <a:t>12.09.2023</a:t>
+              <a:t>10.09.2024</a:t>
             </a:fld>
             <a:endParaRPr lang="ru-RU" dirty="0"/>
           </a:p>
@@ -9457,7 +9457,7 @@
               <a:pPr>
                 <a:defRPr/>
               </a:pPr>
-              <a:t>12.09.2023</a:t>
+              <a:t>10.09.2024</a:t>
             </a:fld>
             <a:endParaRPr lang="ru-RU"/>
           </a:p>
@@ -9680,7 +9680,7 @@
               <a:pPr>
                 <a:defRPr/>
               </a:pPr>
-              <a:t>12.09.2023</a:t>
+              <a:t>10.09.2024</a:t>
             </a:fld>
             <a:endParaRPr lang="ru-RU" dirty="0"/>
           </a:p>
@@ -9875,7 +9875,7 @@
               <a:pPr>
                 <a:defRPr/>
               </a:pPr>
-              <a:t>12.09.2023</a:t>
+              <a:t>10.09.2024</a:t>
             </a:fld>
             <a:endParaRPr lang="ru-RU"/>
           </a:p>
@@ -10506,7 +10506,7 @@
               <a:pPr>
                 <a:defRPr/>
               </a:pPr>
-              <a:t>12.09.2023</a:t>
+              <a:t>10.09.2024</a:t>
             </a:fld>
             <a:endParaRPr lang="ru-RU"/>
           </a:p>

</xml_diff>